<commit_message>
fix: adjust some codes.
</commit_message>
<xml_diff>
--- a/src/voxgpu/gpu/helper.pptx
+++ b/src/voxgpu/gpu/helper.pptx
@@ -8,11 +8,13 @@
     <p:sldId id="256" r:id="rId3"/>
     <p:sldId id="257" r:id="rId4"/>
     <p:sldId id="258" r:id="rId5"/>
+    <p:sldId id="260" r:id="rId6"/>
+    <p:sldId id="261" r:id="rId7"/>
   </p:sldIdLst>
   <p:sldSz cx="12192000" cy="6858000"/>
   <p:notesSz cx="6858000" cy="9144000"/>
   <p:custDataLst>
-    <p:tags r:id="rId9"/>
+    <p:tags r:id="rId11"/>
   </p:custDataLst>
   <p:defaultTextStyle>
     <a:defPPr>
@@ -5827,7 +5829,1739 @@
 </p:sld>
 </file>
 
+<file path=ppt/slides/slide4.xml><?xml version="1.0" encoding="utf-8"?>
+<p:sld xmlns:a="http://schemas.openxmlformats.org/drawingml/2006/main" xmlns:r="http://schemas.openxmlformats.org/officeDocument/2006/relationships" xmlns:p="http://schemas.openxmlformats.org/presentationml/2006/main">
+  <p:cSld>
+    <p:spTree>
+      <p:nvGrpSpPr>
+        <p:cNvPr id="1" name=""/>
+        <p:cNvGrpSpPr/>
+        <p:nvPr/>
+      </p:nvGrpSpPr>
+      <p:grpSpPr/>
+      <p:sp>
+        <p:nvSpPr>
+          <p:cNvPr id="2" name="标题 1"/>
+          <p:cNvSpPr>
+            <a:spLocks noGrp="1"/>
+          </p:cNvSpPr>
+          <p:nvPr>
+            <p:ph type="title"/>
+          </p:nvPr>
+        </p:nvSpPr>
+        <p:spPr>
+          <a:xfrm>
+            <a:off x="155575" y="163195"/>
+            <a:ext cx="8196580" cy="711200"/>
+          </a:xfrm>
+        </p:spPr>
+        <p:txBody>
+          <a:bodyPr>
+            <a:normAutofit/>
+          </a:bodyPr>
+          <a:p>
+            <a:r>
+              <a:rPr lang="en-US" sz="3200"/>
+              <a:t>Base Material Rendering/Computing System</a:t>
+            </a:r>
+            <a:endParaRPr lang="en-US" sz="3200"/>
+          </a:p>
+        </p:txBody>
+      </p:sp>
+      <p:grpSp>
+        <p:nvGrpSpPr>
+          <p:cNvPr id="6" name="组合 5"/>
+          <p:cNvGrpSpPr/>
+          <p:nvPr/>
+        </p:nvGrpSpPr>
+        <p:grpSpPr>
+          <a:xfrm>
+            <a:off x="1296035" y="5806440"/>
+            <a:ext cx="1748790" cy="627380"/>
+            <a:chOff x="2260" y="4714"/>
+            <a:chExt cx="2754" cy="988"/>
+          </a:xfrm>
+        </p:grpSpPr>
+        <p:sp>
+          <p:nvSpPr>
+            <p:cNvPr id="5" name="矩形 4"/>
+            <p:cNvSpPr/>
+            <p:nvPr/>
+          </p:nvSpPr>
+          <p:spPr>
+            <a:xfrm>
+              <a:off x="2260" y="4714"/>
+              <a:ext cx="2754" cy="988"/>
+            </a:xfrm>
+            <a:prstGeom prst="rect">
+              <a:avLst/>
+            </a:prstGeom>
+            <a:solidFill>
+              <a:schemeClr val="bg1"/>
+            </a:solidFill>
+            <a:ln>
+              <a:solidFill>
+                <a:schemeClr val="tx1"/>
+              </a:solidFill>
+            </a:ln>
+          </p:spPr>
+          <p:style>
+            <a:lnRef idx="2">
+              <a:schemeClr val="accent1">
+                <a:lumMod val="75000"/>
+              </a:schemeClr>
+            </a:lnRef>
+            <a:fillRef idx="1">
+              <a:schemeClr val="accent1"/>
+            </a:fillRef>
+            <a:effectRef idx="0">
+              <a:srgbClr val="FFFFFF"/>
+            </a:effectRef>
+            <a:fontRef idx="minor">
+              <a:schemeClr val="lt1"/>
+            </a:fontRef>
+          </p:style>
+          <p:txBody>
+            <a:bodyPr rtlCol="0" anchor="ctr"/>
+            <a:p>
+              <a:pPr algn="ctr"/>
+              <a:endParaRPr lang="zh-CN" altLang="en-US" b="1"/>
+            </a:p>
+          </p:txBody>
+        </p:sp>
+        <p:sp>
+          <p:nvSpPr>
+            <p:cNvPr id="4" name="文本框 3"/>
+            <p:cNvSpPr txBox="1"/>
+            <p:nvPr/>
+          </p:nvSpPr>
+          <p:spPr>
+            <a:xfrm>
+              <a:off x="2634" y="4912"/>
+              <a:ext cx="2011" cy="488"/>
+            </a:xfrm>
+            <a:prstGeom prst="rect">
+              <a:avLst/>
+            </a:prstGeom>
+            <a:noFill/>
+          </p:spPr>
+          <p:txBody>
+            <a:bodyPr wrap="square" rtlCol="0">
+              <a:noAutofit/>
+            </a:bodyPr>
+            <a:p>
+              <a:pPr algn="ctr"/>
+              <a:r>
+                <a:rPr lang="en-US" altLang="zh-CN" sz="1600" b="1"/>
+                <a:t>device</a:t>
+              </a:r>
+              <a:endParaRPr lang="en-US" altLang="zh-CN" sz="1600" b="1"/>
+            </a:p>
+          </p:txBody>
+        </p:sp>
+      </p:grpSp>
+      <p:sp>
+        <p:nvSpPr>
+          <p:cNvPr id="27" name="矩形 26"/>
+          <p:cNvSpPr/>
+          <p:nvPr/>
+        </p:nvSpPr>
+        <p:spPr>
+          <a:xfrm>
+            <a:off x="3585210" y="5806440"/>
+            <a:ext cx="1748790" cy="627380"/>
+          </a:xfrm>
+          <a:prstGeom prst="rect">
+            <a:avLst/>
+          </a:prstGeom>
+          <a:solidFill>
+            <a:schemeClr val="bg1"/>
+          </a:solidFill>
+          <a:ln>
+            <a:solidFill>
+              <a:schemeClr val="tx1"/>
+            </a:solidFill>
+          </a:ln>
+        </p:spPr>
+        <p:style>
+          <a:lnRef idx="2">
+            <a:schemeClr val="accent1">
+              <a:lumMod val="75000"/>
+            </a:schemeClr>
+          </a:lnRef>
+          <a:fillRef idx="1">
+            <a:schemeClr val="accent1"/>
+          </a:fillRef>
+          <a:effectRef idx="0">
+            <a:srgbClr val="FFFFFF"/>
+          </a:effectRef>
+          <a:fontRef idx="minor">
+            <a:schemeClr val="lt1"/>
+          </a:fontRef>
+        </p:style>
+        <p:txBody>
+          <a:bodyPr rtlCol="0" anchor="ctr"/>
+          <a:p>
+            <a:pPr algn="ctr"/>
+            <a:endParaRPr lang="zh-CN" altLang="en-US" b="1"/>
+          </a:p>
+        </p:txBody>
+      </p:sp>
+      <p:sp>
+        <p:nvSpPr>
+          <p:cNvPr id="28" name="文本框 27"/>
+          <p:cNvSpPr txBox="1"/>
+          <p:nvPr/>
+        </p:nvSpPr>
+        <p:spPr>
+          <a:xfrm>
+            <a:off x="3650615" y="5932170"/>
+            <a:ext cx="1644650" cy="309880"/>
+          </a:xfrm>
+          <a:prstGeom prst="rect">
+            <a:avLst/>
+          </a:prstGeom>
+          <a:noFill/>
+        </p:spPr>
+        <p:txBody>
+          <a:bodyPr wrap="square" rtlCol="0">
+            <a:noAutofit/>
+          </a:bodyPr>
+          <a:p>
+            <a:pPr algn="ctr"/>
+            <a:r>
+              <a:rPr lang="en-US" altLang="zh-CN" sz="1600" b="1"/>
+              <a:t>renderPipeline</a:t>
+            </a:r>
+            <a:endParaRPr lang="en-US" altLang="zh-CN" sz="1600" b="1"/>
+          </a:p>
+        </p:txBody>
+      </p:sp>
+      <p:cxnSp>
+        <p:nvCxnSpPr>
+          <p:cNvPr id="29" name="直接箭头连接符 28"/>
+          <p:cNvCxnSpPr>
+            <a:stCxn id="71" idx="3"/>
+          </p:cNvCxnSpPr>
+          <p:nvPr/>
+        </p:nvCxnSpPr>
+        <p:spPr>
+          <a:xfrm>
+            <a:off x="6301105" y="2993390"/>
+            <a:ext cx="738505" cy="0"/>
+          </a:xfrm>
+          <a:prstGeom prst="straightConnector1">
+            <a:avLst/>
+          </a:prstGeom>
+          <a:ln>
+            <a:solidFill>
+              <a:schemeClr val="accent1"/>
+            </a:solidFill>
+            <a:tailEnd type="arrow"/>
+          </a:ln>
+        </p:spPr>
+        <p:style>
+          <a:lnRef idx="2">
+            <a:schemeClr val="accent1"/>
+          </a:lnRef>
+          <a:fillRef idx="0">
+            <a:srgbClr val="FFFFFF"/>
+          </a:fillRef>
+          <a:effectRef idx="0">
+            <a:srgbClr val="FFFFFF"/>
+          </a:effectRef>
+          <a:fontRef idx="minor">
+            <a:schemeClr val="tx1"/>
+          </a:fontRef>
+        </p:style>
+      </p:cxnSp>
+      <p:cxnSp>
+        <p:nvCxnSpPr>
+          <p:cNvPr id="46" name="直接箭头连接符 45"/>
+          <p:cNvCxnSpPr/>
+          <p:nvPr/>
+        </p:nvCxnSpPr>
+        <p:spPr>
+          <a:xfrm>
+            <a:off x="4455795" y="5375275"/>
+            <a:ext cx="3810" cy="431165"/>
+          </a:xfrm>
+          <a:prstGeom prst="straightConnector1">
+            <a:avLst/>
+          </a:prstGeom>
+          <a:ln>
+            <a:solidFill>
+              <a:schemeClr val="accent4">
+                <a:lumMod val="75000"/>
+              </a:schemeClr>
+            </a:solidFill>
+            <a:tailEnd type="arrow"/>
+          </a:ln>
+        </p:spPr>
+        <p:style>
+          <a:lnRef idx="2">
+            <a:schemeClr val="accent1"/>
+          </a:lnRef>
+          <a:fillRef idx="0">
+            <a:srgbClr val="FFFFFF"/>
+          </a:fillRef>
+          <a:effectRef idx="0">
+            <a:srgbClr val="FFFFFF"/>
+          </a:effectRef>
+          <a:fontRef idx="minor">
+            <a:schemeClr val="tx1"/>
+          </a:fontRef>
+        </p:style>
+      </p:cxnSp>
+      <p:cxnSp>
+        <p:nvCxnSpPr>
+          <p:cNvPr id="64" name="直接箭头连接符 63"/>
+          <p:cNvCxnSpPr/>
+          <p:nvPr/>
+        </p:nvCxnSpPr>
+        <p:spPr>
+          <a:xfrm flipH="1">
+            <a:off x="9601200" y="1175385"/>
+            <a:ext cx="1066165" cy="407670"/>
+          </a:xfrm>
+          <a:prstGeom prst="straightConnector1">
+            <a:avLst/>
+          </a:prstGeom>
+          <a:ln>
+            <a:tailEnd type="arrow"/>
+          </a:ln>
+        </p:spPr>
+        <p:style>
+          <a:lnRef idx="2">
+            <a:schemeClr val="accent1"/>
+          </a:lnRef>
+          <a:fillRef idx="0">
+            <a:srgbClr val="FFFFFF"/>
+          </a:fillRef>
+          <a:effectRef idx="0">
+            <a:srgbClr val="FFFFFF"/>
+          </a:effectRef>
+          <a:fontRef idx="minor">
+            <a:schemeClr val="tx1"/>
+          </a:fontRef>
+        </p:style>
+      </p:cxnSp>
+      <p:sp>
+        <p:nvSpPr>
+          <p:cNvPr id="68" name="矩形 67"/>
+          <p:cNvSpPr/>
+          <p:nvPr/>
+        </p:nvSpPr>
+        <p:spPr>
+          <a:xfrm>
+            <a:off x="1508760" y="1532890"/>
+            <a:ext cx="2167890" cy="488315"/>
+          </a:xfrm>
+          <a:prstGeom prst="rect">
+            <a:avLst/>
+          </a:prstGeom>
+          <a:solidFill>
+            <a:schemeClr val="bg1"/>
+          </a:solidFill>
+          <a:ln>
+            <a:solidFill>
+              <a:schemeClr val="tx1"/>
+            </a:solidFill>
+          </a:ln>
+        </p:spPr>
+        <p:style>
+          <a:lnRef idx="2">
+            <a:schemeClr val="accent1">
+              <a:lumMod val="75000"/>
+            </a:schemeClr>
+          </a:lnRef>
+          <a:fillRef idx="1">
+            <a:schemeClr val="accent1"/>
+          </a:fillRef>
+          <a:effectRef idx="0">
+            <a:srgbClr val="FFFFFF"/>
+          </a:effectRef>
+          <a:fontRef idx="minor">
+            <a:schemeClr val="lt1"/>
+          </a:fontRef>
+        </p:style>
+        <p:txBody>
+          <a:bodyPr rtlCol="0" anchor="ctr"/>
+          <a:p>
+            <a:pPr algn="ctr"/>
+            <a:endParaRPr lang="zh-CN" altLang="en-US" b="1"/>
+          </a:p>
+        </p:txBody>
+      </p:sp>
+      <p:sp>
+        <p:nvSpPr>
+          <p:cNvPr id="69" name="文本框 68"/>
+          <p:cNvSpPr txBox="1"/>
+          <p:nvPr/>
+        </p:nvSpPr>
+        <p:spPr>
+          <a:xfrm>
+            <a:off x="1553210" y="1617980"/>
+            <a:ext cx="2027555" cy="309880"/>
+          </a:xfrm>
+          <a:prstGeom prst="rect">
+            <a:avLst/>
+          </a:prstGeom>
+          <a:noFill/>
+        </p:spPr>
+        <p:txBody>
+          <a:bodyPr wrap="square" rtlCol="0">
+            <a:noAutofit/>
+          </a:bodyPr>
+          <a:p>
+            <a:pPr algn="ctr"/>
+            <a:r>
+              <a:rPr lang="en-US" altLang="zh-CN" sz="1600" b="1"/>
+              <a:t>rendering/computing</a:t>
+            </a:r>
+            <a:endParaRPr lang="en-US" altLang="zh-CN" sz="1600" b="1"/>
+          </a:p>
+        </p:txBody>
+      </p:sp>
+      <p:cxnSp>
+        <p:nvCxnSpPr>
+          <p:cNvPr id="70" name="直接箭头连接符 69"/>
+          <p:cNvCxnSpPr/>
+          <p:nvPr/>
+        </p:nvCxnSpPr>
+        <p:spPr>
+          <a:xfrm flipH="1" flipV="1">
+            <a:off x="8905240" y="1095375"/>
+            <a:ext cx="332105" cy="4445"/>
+          </a:xfrm>
+          <a:prstGeom prst="straightConnector1">
+            <a:avLst/>
+          </a:prstGeom>
+          <a:ln>
+            <a:tailEnd type="arrow"/>
+          </a:ln>
+        </p:spPr>
+        <p:style>
+          <a:lnRef idx="2">
+            <a:schemeClr val="accent1"/>
+          </a:lnRef>
+          <a:fillRef idx="0">
+            <a:srgbClr val="FFFFFF"/>
+          </a:fillRef>
+          <a:effectRef idx="0">
+            <a:srgbClr val="FFFFFF"/>
+          </a:effectRef>
+          <a:fontRef idx="minor">
+            <a:schemeClr val="tx1"/>
+          </a:fontRef>
+        </p:style>
+      </p:cxnSp>
+      <p:sp>
+        <p:nvSpPr>
+          <p:cNvPr id="71" name="矩形 70"/>
+          <p:cNvSpPr/>
+          <p:nvPr/>
+        </p:nvSpPr>
+        <p:spPr>
+          <a:xfrm>
+            <a:off x="4317365" y="2679700"/>
+            <a:ext cx="1983740" cy="627380"/>
+          </a:xfrm>
+          <a:prstGeom prst="rect">
+            <a:avLst/>
+          </a:prstGeom>
+          <a:solidFill>
+            <a:schemeClr val="bg1"/>
+          </a:solidFill>
+          <a:ln>
+            <a:solidFill>
+              <a:schemeClr val="accent1"/>
+            </a:solidFill>
+          </a:ln>
+        </p:spPr>
+        <p:style>
+          <a:lnRef idx="2">
+            <a:schemeClr val="accent1">
+              <a:lumMod val="75000"/>
+            </a:schemeClr>
+          </a:lnRef>
+          <a:fillRef idx="1">
+            <a:schemeClr val="accent1"/>
+          </a:fillRef>
+          <a:effectRef idx="0">
+            <a:srgbClr val="FFFFFF"/>
+          </a:effectRef>
+          <a:fontRef idx="minor">
+            <a:schemeClr val="lt1"/>
+          </a:fontRef>
+        </p:style>
+        <p:txBody>
+          <a:bodyPr rtlCol="0" anchor="ctr"/>
+          <a:p>
+            <a:pPr algn="ctr"/>
+            <a:endParaRPr lang="zh-CN" altLang="en-US" b="1"/>
+          </a:p>
+        </p:txBody>
+      </p:sp>
+      <p:sp>
+        <p:nvSpPr>
+          <p:cNvPr id="72" name="文本框 71"/>
+          <p:cNvSpPr txBox="1"/>
+          <p:nvPr/>
+        </p:nvSpPr>
+        <p:spPr>
+          <a:xfrm>
+            <a:off x="4421505" y="2818765"/>
+            <a:ext cx="1807845" cy="309880"/>
+          </a:xfrm>
+          <a:prstGeom prst="rect">
+            <a:avLst/>
+          </a:prstGeom>
+          <a:noFill/>
+        </p:spPr>
+        <p:txBody>
+          <a:bodyPr wrap="square" rtlCol="0">
+            <a:noAutofit/>
+          </a:bodyPr>
+          <a:p>
+            <a:pPr algn="ctr"/>
+            <a:r>
+              <a:rPr lang="zh-CN" altLang="en-US" sz="1600" b="1"/>
+              <a:t>若干</a:t>
+            </a:r>
+            <a:r>
+              <a:rPr lang="en-US" altLang="zh-CN" sz="1600" b="1"/>
+              <a:t>PassNode</a:t>
+            </a:r>
+            <a:endParaRPr lang="en-US" altLang="zh-CN" sz="1600" b="1"/>
+          </a:p>
+        </p:txBody>
+      </p:sp>
+      <p:sp>
+        <p:nvSpPr>
+          <p:cNvPr id="73" name="矩形 72"/>
+          <p:cNvSpPr/>
+          <p:nvPr/>
+        </p:nvSpPr>
+        <p:spPr>
+          <a:xfrm>
+            <a:off x="2732405" y="4651375"/>
+            <a:ext cx="1983740" cy="627380"/>
+          </a:xfrm>
+          <a:prstGeom prst="rect">
+            <a:avLst/>
+          </a:prstGeom>
+          <a:solidFill>
+            <a:schemeClr val="bg1"/>
+          </a:solidFill>
+          <a:ln>
+            <a:solidFill>
+              <a:schemeClr val="accent1"/>
+            </a:solidFill>
+          </a:ln>
+        </p:spPr>
+        <p:style>
+          <a:lnRef idx="2">
+            <a:schemeClr val="accent1">
+              <a:lumMod val="75000"/>
+            </a:schemeClr>
+          </a:lnRef>
+          <a:fillRef idx="1">
+            <a:schemeClr val="accent1"/>
+          </a:fillRef>
+          <a:effectRef idx="0">
+            <a:srgbClr val="FFFFFF"/>
+          </a:effectRef>
+          <a:fontRef idx="minor">
+            <a:schemeClr val="lt1"/>
+          </a:fontRef>
+        </p:style>
+        <p:txBody>
+          <a:bodyPr rtlCol="0" anchor="ctr"/>
+          <a:p>
+            <a:pPr algn="ctr"/>
+            <a:endParaRPr lang="zh-CN" altLang="en-US" b="1"/>
+          </a:p>
+        </p:txBody>
+      </p:sp>
+      <p:sp>
+        <p:nvSpPr>
+          <p:cNvPr id="74" name="文本框 73"/>
+          <p:cNvSpPr txBox="1"/>
+          <p:nvPr/>
+        </p:nvSpPr>
+        <p:spPr>
+          <a:xfrm>
+            <a:off x="2836545" y="4790440"/>
+            <a:ext cx="1807845" cy="309880"/>
+          </a:xfrm>
+          <a:prstGeom prst="rect">
+            <a:avLst/>
+          </a:prstGeom>
+          <a:noFill/>
+        </p:spPr>
+        <p:txBody>
+          <a:bodyPr wrap="square" rtlCol="0">
+            <a:noAutofit/>
+          </a:bodyPr>
+          <a:p>
+            <a:pPr algn="ctr"/>
+            <a:r>
+              <a:rPr lang="en-US" altLang="zh-CN" sz="1600" b="1"/>
+              <a:t>depthStencilState</a:t>
+            </a:r>
+            <a:endParaRPr lang="en-US" altLang="zh-CN" sz="1600" b="1"/>
+          </a:p>
+        </p:txBody>
+      </p:sp>
+      <p:sp>
+        <p:nvSpPr>
+          <p:cNvPr id="75" name="矩形 74"/>
+          <p:cNvSpPr/>
+          <p:nvPr/>
+        </p:nvSpPr>
+        <p:spPr>
+          <a:xfrm>
+            <a:off x="5772785" y="4720590"/>
+            <a:ext cx="1748155" cy="488315"/>
+          </a:xfrm>
+          <a:prstGeom prst="rect">
+            <a:avLst/>
+          </a:prstGeom>
+          <a:solidFill>
+            <a:schemeClr val="bg1"/>
+          </a:solidFill>
+          <a:ln>
+            <a:solidFill>
+              <a:schemeClr val="tx1"/>
+            </a:solidFill>
+          </a:ln>
+        </p:spPr>
+        <p:style>
+          <a:lnRef idx="2">
+            <a:schemeClr val="accent1">
+              <a:lumMod val="75000"/>
+            </a:schemeClr>
+          </a:lnRef>
+          <a:fillRef idx="1">
+            <a:schemeClr val="accent1"/>
+          </a:fillRef>
+          <a:effectRef idx="0">
+            <a:srgbClr val="FFFFFF"/>
+          </a:effectRef>
+          <a:fontRef idx="minor">
+            <a:schemeClr val="lt1"/>
+          </a:fontRef>
+        </p:style>
+        <p:txBody>
+          <a:bodyPr rtlCol="0" anchor="ctr"/>
+          <a:p>
+            <a:pPr algn="ctr"/>
+            <a:endParaRPr lang="zh-CN" altLang="en-US" b="1"/>
+          </a:p>
+        </p:txBody>
+      </p:sp>
+      <p:sp>
+        <p:nvSpPr>
+          <p:cNvPr id="76" name="文本框 75"/>
+          <p:cNvSpPr txBox="1"/>
+          <p:nvPr/>
+        </p:nvSpPr>
+        <p:spPr>
+          <a:xfrm>
+            <a:off x="5817235" y="4805680"/>
+            <a:ext cx="1694180" cy="309880"/>
+          </a:xfrm>
+          <a:prstGeom prst="rect">
+            <a:avLst/>
+          </a:prstGeom>
+          <a:noFill/>
+        </p:spPr>
+        <p:txBody>
+          <a:bodyPr wrap="square" rtlCol="0">
+            <a:noAutofit/>
+          </a:bodyPr>
+          <a:p>
+            <a:pPr algn="ctr"/>
+            <a:r>
+              <a:rPr lang="en-US" altLang="zh-CN" sz="1600" b="1"/>
+              <a:t>stencilFaceState</a:t>
+            </a:r>
+            <a:endParaRPr lang="en-US" altLang="zh-CN" sz="1600" b="1"/>
+          </a:p>
+        </p:txBody>
+      </p:sp>
+      <p:cxnSp>
+        <p:nvCxnSpPr>
+          <p:cNvPr id="77" name="直接箭头连接符 76"/>
+          <p:cNvCxnSpPr>
+            <a:stCxn id="75" idx="1"/>
+            <a:endCxn id="73" idx="3"/>
+          </p:cNvCxnSpPr>
+          <p:nvPr/>
+        </p:nvCxnSpPr>
+        <p:spPr>
+          <a:xfrm flipH="1">
+            <a:off x="4716145" y="4965065"/>
+            <a:ext cx="1056640" cy="0"/>
+          </a:xfrm>
+          <a:prstGeom prst="straightConnector1">
+            <a:avLst/>
+          </a:prstGeom>
+          <a:ln>
+            <a:tailEnd type="arrow"/>
+          </a:ln>
+        </p:spPr>
+        <p:style>
+          <a:lnRef idx="2">
+            <a:schemeClr val="accent1"/>
+          </a:lnRef>
+          <a:fillRef idx="0">
+            <a:srgbClr val="FFFFFF"/>
+          </a:fillRef>
+          <a:effectRef idx="0">
+            <a:srgbClr val="FFFFFF"/>
+          </a:effectRef>
+          <a:fontRef idx="minor">
+            <a:schemeClr val="tx1"/>
+          </a:fontRef>
+        </p:style>
+      </p:cxnSp>
+      <p:sp>
+        <p:nvSpPr>
+          <p:cNvPr id="3" name="矩形 2"/>
+          <p:cNvSpPr/>
+          <p:nvPr/>
+        </p:nvSpPr>
+        <p:spPr>
+          <a:xfrm>
+            <a:off x="1595120" y="2679700"/>
+            <a:ext cx="1983740" cy="627380"/>
+          </a:xfrm>
+          <a:prstGeom prst="rect">
+            <a:avLst/>
+          </a:prstGeom>
+          <a:solidFill>
+            <a:schemeClr val="bg1"/>
+          </a:solidFill>
+          <a:ln>
+            <a:solidFill>
+              <a:schemeClr val="accent1"/>
+            </a:solidFill>
+          </a:ln>
+        </p:spPr>
+        <p:style>
+          <a:lnRef idx="2">
+            <a:schemeClr val="accent1">
+              <a:lumMod val="75000"/>
+            </a:schemeClr>
+          </a:lnRef>
+          <a:fillRef idx="1">
+            <a:schemeClr val="accent1"/>
+          </a:fillRef>
+          <a:effectRef idx="0">
+            <a:srgbClr val="FFFFFF"/>
+          </a:effectRef>
+          <a:fontRef idx="minor">
+            <a:schemeClr val="lt1"/>
+          </a:fontRef>
+        </p:style>
+        <p:txBody>
+          <a:bodyPr rtlCol="0" anchor="ctr"/>
+          <a:p>
+            <a:pPr algn="ctr"/>
+            <a:endParaRPr lang="zh-CN" altLang="en-US" b="1"/>
+          </a:p>
+        </p:txBody>
+      </p:sp>
+      <p:sp>
+        <p:nvSpPr>
+          <p:cNvPr id="7" name="文本框 6"/>
+          <p:cNvSpPr txBox="1"/>
+          <p:nvPr/>
+        </p:nvSpPr>
+        <p:spPr>
+          <a:xfrm>
+            <a:off x="1699260" y="2818765"/>
+            <a:ext cx="1807845" cy="309880"/>
+          </a:xfrm>
+          <a:prstGeom prst="rect">
+            <a:avLst/>
+          </a:prstGeom>
+          <a:noFill/>
+        </p:spPr>
+        <p:txBody>
+          <a:bodyPr wrap="square" rtlCol="0">
+            <a:noAutofit/>
+          </a:bodyPr>
+          <a:p>
+            <a:pPr algn="ctr"/>
+            <a:r>
+              <a:rPr lang="zh-CN" altLang="en-US" sz="1600" b="1"/>
+              <a:t>若干</a:t>
+            </a:r>
+            <a:r>
+              <a:rPr lang="en-US" altLang="zh-CN" sz="1600" b="1"/>
+              <a:t>Material</a:t>
+            </a:r>
+            <a:endParaRPr lang="en-US" altLang="zh-CN" sz="1600" b="1"/>
+          </a:p>
+        </p:txBody>
+      </p:sp>
+      <p:cxnSp>
+        <p:nvCxnSpPr>
+          <p:cNvPr id="8" name="直接箭头连接符 7"/>
+          <p:cNvCxnSpPr>
+            <a:stCxn id="3" idx="3"/>
+            <a:endCxn id="71" idx="1"/>
+          </p:cNvCxnSpPr>
+          <p:nvPr/>
+        </p:nvCxnSpPr>
+        <p:spPr>
+          <a:xfrm>
+            <a:off x="3578860" y="2993390"/>
+            <a:ext cx="738505" cy="0"/>
+          </a:xfrm>
+          <a:prstGeom prst="straightConnector1">
+            <a:avLst/>
+          </a:prstGeom>
+          <a:ln>
+            <a:tailEnd type="arrow"/>
+          </a:ln>
+        </p:spPr>
+        <p:style>
+          <a:lnRef idx="2">
+            <a:schemeClr val="accent1"/>
+          </a:lnRef>
+          <a:fillRef idx="0">
+            <a:srgbClr val="FFFFFF"/>
+          </a:fillRef>
+          <a:effectRef idx="0">
+            <a:srgbClr val="FFFFFF"/>
+          </a:effectRef>
+          <a:fontRef idx="minor">
+            <a:schemeClr val="tx1"/>
+          </a:fontRef>
+        </p:style>
+      </p:cxnSp>
+      <p:sp>
+        <p:nvSpPr>
+          <p:cNvPr id="9" name="矩形 8"/>
+          <p:cNvSpPr/>
+          <p:nvPr/>
+        </p:nvSpPr>
+        <p:spPr>
+          <a:xfrm>
+            <a:off x="7039610" y="2679700"/>
+            <a:ext cx="1983740" cy="627380"/>
+          </a:xfrm>
+          <a:prstGeom prst="rect">
+            <a:avLst/>
+          </a:prstGeom>
+          <a:solidFill>
+            <a:schemeClr val="bg1"/>
+          </a:solidFill>
+          <a:ln>
+            <a:solidFill>
+              <a:schemeClr val="accent1"/>
+            </a:solidFill>
+          </a:ln>
+        </p:spPr>
+        <p:style>
+          <a:lnRef idx="2">
+            <a:schemeClr val="accent1">
+              <a:lumMod val="75000"/>
+            </a:schemeClr>
+          </a:lnRef>
+          <a:fillRef idx="1">
+            <a:schemeClr val="accent1"/>
+          </a:fillRef>
+          <a:effectRef idx="0">
+            <a:srgbClr val="FFFFFF"/>
+          </a:effectRef>
+          <a:fontRef idx="minor">
+            <a:schemeClr val="lt1"/>
+          </a:fontRef>
+        </p:style>
+        <p:txBody>
+          <a:bodyPr rtlCol="0" anchor="ctr"/>
+          <a:p>
+            <a:pPr algn="ctr"/>
+            <a:endParaRPr lang="zh-CN" altLang="en-US" b="1"/>
+          </a:p>
+        </p:txBody>
+      </p:sp>
+      <p:sp>
+        <p:nvSpPr>
+          <p:cNvPr id="12" name="文本框 11"/>
+          <p:cNvSpPr txBox="1"/>
+          <p:nvPr/>
+        </p:nvSpPr>
+        <p:spPr>
+          <a:xfrm>
+            <a:off x="7143750" y="2818765"/>
+            <a:ext cx="1807845" cy="309880"/>
+          </a:xfrm>
+          <a:prstGeom prst="rect">
+            <a:avLst/>
+          </a:prstGeom>
+          <a:noFill/>
+        </p:spPr>
+        <p:txBody>
+          <a:bodyPr wrap="square" rtlCol="0">
+            <a:noAutofit/>
+          </a:bodyPr>
+          <a:p>
+            <a:pPr algn="ctr"/>
+            <a:r>
+              <a:rPr lang="zh-CN" sz="1600" b="1"/>
+              <a:t>渲染管理系统</a:t>
+            </a:r>
+            <a:endParaRPr lang="zh-CN" sz="1600" b="1"/>
+          </a:p>
+        </p:txBody>
+      </p:sp>
+      <p:cxnSp>
+        <p:nvCxnSpPr>
+          <p:cNvPr id="20" name="直接箭头连接符 19"/>
+          <p:cNvCxnSpPr>
+            <a:stCxn id="68" idx="2"/>
+            <a:endCxn id="3" idx="0"/>
+          </p:cNvCxnSpPr>
+          <p:nvPr/>
+        </p:nvCxnSpPr>
+        <p:spPr>
+          <a:xfrm flipH="1">
+            <a:off x="2586990" y="2021205"/>
+            <a:ext cx="5715" cy="658495"/>
+          </a:xfrm>
+          <a:prstGeom prst="straightConnector1">
+            <a:avLst/>
+          </a:prstGeom>
+          <a:ln>
+            <a:tailEnd type="arrow"/>
+          </a:ln>
+        </p:spPr>
+        <p:style>
+          <a:lnRef idx="2">
+            <a:schemeClr val="accent1"/>
+          </a:lnRef>
+          <a:fillRef idx="0">
+            <a:srgbClr val="FFFFFF"/>
+          </a:fillRef>
+          <a:effectRef idx="0">
+            <a:srgbClr val="FFFFFF"/>
+          </a:effectRef>
+          <a:fontRef idx="minor">
+            <a:schemeClr val="tx1"/>
+          </a:fontRef>
+        </p:style>
+      </p:cxnSp>
+      <p:sp>
+        <p:nvSpPr>
+          <p:cNvPr id="21" name="文本框 20"/>
+          <p:cNvSpPr txBox="1"/>
+          <p:nvPr>
+            <p:custDataLst>
+              <p:tags r:id="rId1"/>
+            </p:custDataLst>
+          </p:nvPr>
+        </p:nvSpPr>
+        <p:spPr>
+          <a:xfrm>
+            <a:off x="5099050" y="869315"/>
+            <a:ext cx="2497455" cy="309880"/>
+          </a:xfrm>
+          <a:prstGeom prst="rect">
+            <a:avLst/>
+          </a:prstGeom>
+          <a:noFill/>
+        </p:spPr>
+        <p:txBody>
+          <a:bodyPr wrap="square" rtlCol="0">
+            <a:noAutofit/>
+          </a:bodyPr>
+          <a:p>
+            <a:pPr algn="ctr"/>
+            <a:r>
+              <a:rPr lang="en-US" altLang="zh-CN" sz="1600" b="1"/>
+              <a:t>Renderer&amp;Computer</a:t>
+            </a:r>
+            <a:endParaRPr lang="en-US" altLang="zh-CN" sz="1600" b="1"/>
+          </a:p>
+        </p:txBody>
+      </p:sp>
+    </p:spTree>
+  </p:cSld>
+  <p:clrMapOvr>
+    <a:masterClrMapping/>
+  </p:clrMapOvr>
+</p:sld>
+</file>
+
+<file path=ppt/slides/slide5.xml><?xml version="1.0" encoding="utf-8"?>
+<p:sld xmlns:a="http://schemas.openxmlformats.org/drawingml/2006/main" xmlns:r="http://schemas.openxmlformats.org/officeDocument/2006/relationships" xmlns:p="http://schemas.openxmlformats.org/presentationml/2006/main">
+  <p:cSld>
+    <p:spTree>
+      <p:nvGrpSpPr>
+        <p:cNvPr id="1" name=""/>
+        <p:cNvGrpSpPr/>
+        <p:nvPr/>
+      </p:nvGrpSpPr>
+      <p:grpSpPr/>
+      <p:sp>
+        <p:nvSpPr>
+          <p:cNvPr id="2" name="标题 1"/>
+          <p:cNvSpPr>
+            <a:spLocks noGrp="1"/>
+          </p:cNvSpPr>
+          <p:nvPr>
+            <p:ph type="title"/>
+          </p:nvPr>
+        </p:nvSpPr>
+        <p:spPr>
+          <a:xfrm>
+            <a:off x="155575" y="163195"/>
+            <a:ext cx="8196580" cy="711200"/>
+          </a:xfrm>
+        </p:spPr>
+        <p:txBody>
+          <a:bodyPr>
+            <a:normAutofit/>
+          </a:bodyPr>
+          <a:p>
+            <a:r>
+              <a:rPr lang="en-US" sz="3200"/>
+              <a:t>MRCS(Mixed Rendering/Computing System)</a:t>
+            </a:r>
+            <a:endParaRPr lang="en-US" sz="3200"/>
+          </a:p>
+        </p:txBody>
+      </p:sp>
+      <p:sp>
+        <p:nvSpPr>
+          <p:cNvPr id="10" name="椭圆 9"/>
+          <p:cNvSpPr/>
+          <p:nvPr/>
+        </p:nvSpPr>
+        <p:spPr>
+          <a:xfrm>
+            <a:off x="3070225" y="660400"/>
+            <a:ext cx="6229350" cy="6131560"/>
+          </a:xfrm>
+          <a:prstGeom prst="ellipse">
+            <a:avLst/>
+          </a:prstGeom>
+          <a:solidFill>
+            <a:schemeClr val="accent1">
+              <a:lumMod val="60000"/>
+              <a:lumOff val="40000"/>
+            </a:schemeClr>
+          </a:solidFill>
+          <a:ln>
+            <a:noFill/>
+          </a:ln>
+        </p:spPr>
+        <p:style>
+          <a:lnRef idx="2">
+            <a:schemeClr val="accent1">
+              <a:lumMod val="75000"/>
+            </a:schemeClr>
+          </a:lnRef>
+          <a:fillRef idx="1">
+            <a:schemeClr val="accent1"/>
+          </a:fillRef>
+          <a:effectRef idx="0">
+            <a:srgbClr val="FFFFFF"/>
+          </a:effectRef>
+          <a:fontRef idx="minor">
+            <a:schemeClr val="lt1"/>
+          </a:fontRef>
+        </p:style>
+        <p:txBody>
+          <a:bodyPr rtlCol="0" anchor="ctr"/>
+          <a:p>
+            <a:pPr algn="ctr"/>
+            <a:endParaRPr lang="zh-CN" altLang="en-US"/>
+          </a:p>
+        </p:txBody>
+      </p:sp>
+      <p:sp>
+        <p:nvSpPr>
+          <p:cNvPr id="11" name="椭圆 10"/>
+          <p:cNvSpPr/>
+          <p:nvPr/>
+        </p:nvSpPr>
+        <p:spPr>
+          <a:xfrm>
+            <a:off x="4268153" y="1795780"/>
+            <a:ext cx="3833495" cy="3860800"/>
+          </a:xfrm>
+          <a:prstGeom prst="ellipse">
+            <a:avLst/>
+          </a:prstGeom>
+          <a:solidFill>
+            <a:schemeClr val="accent4">
+              <a:lumMod val="60000"/>
+              <a:lumOff val="40000"/>
+            </a:schemeClr>
+          </a:solidFill>
+          <a:ln>
+            <a:noFill/>
+          </a:ln>
+        </p:spPr>
+        <p:style>
+          <a:lnRef idx="2">
+            <a:schemeClr val="accent1">
+              <a:lumMod val="75000"/>
+            </a:schemeClr>
+          </a:lnRef>
+          <a:fillRef idx="1">
+            <a:schemeClr val="accent1"/>
+          </a:fillRef>
+          <a:effectRef idx="0">
+            <a:srgbClr val="FFFFFF"/>
+          </a:effectRef>
+          <a:fontRef idx="minor">
+            <a:schemeClr val="lt1"/>
+          </a:fontRef>
+        </p:style>
+        <p:txBody>
+          <a:bodyPr rtlCol="0" anchor="ctr"/>
+          <a:p>
+            <a:pPr algn="ctr"/>
+            <a:endParaRPr lang="zh-CN" altLang="en-US"/>
+          </a:p>
+        </p:txBody>
+      </p:sp>
+      <p:sp>
+        <p:nvSpPr>
+          <p:cNvPr id="13" name="标题 1"/>
+          <p:cNvSpPr>
+            <a:spLocks noGrp="1"/>
+          </p:cNvSpPr>
+          <p:nvPr/>
+        </p:nvSpPr>
+        <p:spPr>
+          <a:xfrm>
+            <a:off x="4135120" y="2863215"/>
+            <a:ext cx="4098290" cy="1779905"/>
+          </a:xfrm>
+          <a:prstGeom prst="rect">
+            <a:avLst/>
+          </a:prstGeom>
+        </p:spPr>
+        <p:txBody>
+          <a:bodyPr vert="horz" lIns="91440" tIns="45720" rIns="91440" bIns="45720" rtlCol="0" anchor="ctr">
+            <a:normAutofit/>
+          </a:bodyPr>
+          <a:lstStyle>
+            <a:lvl1pPr algn="l" defTabSz="914400" rtl="0" eaLnBrk="1" latinLnBrk="0" hangingPunct="1">
+              <a:lnSpc>
+                <a:spcPct val="90000"/>
+              </a:lnSpc>
+              <a:spcBef>
+                <a:spcPct val="0"/>
+              </a:spcBef>
+              <a:buNone/>
+              <a:defRPr sz="4400" kern="1200">
+                <a:solidFill>
+                  <a:schemeClr val="tx1"/>
+                </a:solidFill>
+                <a:latin typeface="+mj-lt"/>
+                <a:ea typeface="+mj-ea"/>
+                <a:cs typeface="+mj-cs"/>
+              </a:defRPr>
+            </a:lvl1pPr>
+          </a:lstStyle>
+          <a:p>
+            <a:pPr algn="ctr"/>
+            <a:r>
+              <a:rPr lang="zh-CN" altLang="en-US" sz="3200"/>
+              <a:t>渲染器</a:t>
+            </a:r>
+            <a:endParaRPr lang="en-US" sz="3200"/>
+          </a:p>
+          <a:p>
+            <a:pPr algn="ctr"/>
+            <a:r>
+              <a:rPr lang="en-US" sz="3200"/>
+              <a:t>/</a:t>
+            </a:r>
+            <a:endParaRPr lang="en-US" sz="3200"/>
+          </a:p>
+          <a:p>
+            <a:pPr algn="ctr"/>
+            <a:r>
+              <a:rPr lang="zh-CN" altLang="en-US" sz="3200"/>
+              <a:t>计算器</a:t>
+            </a:r>
+            <a:endParaRPr lang="zh-CN" altLang="en-US" sz="3200"/>
+          </a:p>
+        </p:txBody>
+      </p:sp>
+      <p:sp>
+        <p:nvSpPr>
+          <p:cNvPr id="14" name="椭圆 13"/>
+          <p:cNvSpPr/>
+          <p:nvPr/>
+        </p:nvSpPr>
+        <p:spPr>
+          <a:xfrm>
+            <a:off x="1503045" y="2893695"/>
+            <a:ext cx="2093595" cy="2108835"/>
+          </a:xfrm>
+          <a:prstGeom prst="ellipse">
+            <a:avLst/>
+          </a:prstGeom>
+          <a:solidFill>
+            <a:schemeClr val="accent5">
+              <a:lumMod val="40000"/>
+              <a:lumOff val="60000"/>
+            </a:schemeClr>
+          </a:solidFill>
+          <a:ln>
+            <a:noFill/>
+          </a:ln>
+        </p:spPr>
+        <p:style>
+          <a:lnRef idx="2">
+            <a:schemeClr val="accent1">
+              <a:lumMod val="75000"/>
+            </a:schemeClr>
+          </a:lnRef>
+          <a:fillRef idx="1">
+            <a:schemeClr val="accent1"/>
+          </a:fillRef>
+          <a:effectRef idx="0">
+            <a:srgbClr val="FFFFFF"/>
+          </a:effectRef>
+          <a:fontRef idx="minor">
+            <a:schemeClr val="lt1"/>
+          </a:fontRef>
+        </p:style>
+        <p:txBody>
+          <a:bodyPr rtlCol="0" anchor="ctr"/>
+          <a:p>
+            <a:pPr algn="ctr"/>
+            <a:endParaRPr lang="zh-CN" altLang="en-US"/>
+          </a:p>
+        </p:txBody>
+      </p:sp>
+      <p:sp>
+        <p:nvSpPr>
+          <p:cNvPr id="16" name="标题 1"/>
+          <p:cNvSpPr>
+            <a:spLocks noGrp="1"/>
+          </p:cNvSpPr>
+          <p:nvPr/>
+        </p:nvSpPr>
+        <p:spPr>
+          <a:xfrm>
+            <a:off x="1412875" y="3656330"/>
+            <a:ext cx="2183765" cy="695960"/>
+          </a:xfrm>
+          <a:prstGeom prst="rect">
+            <a:avLst/>
+          </a:prstGeom>
+        </p:spPr>
+        <p:txBody>
+          <a:bodyPr vert="horz" lIns="91440" tIns="45720" rIns="91440" bIns="45720" rtlCol="0" anchor="ctr">
+            <a:normAutofit/>
+          </a:bodyPr>
+          <a:lstStyle>
+            <a:lvl1pPr algn="l" defTabSz="914400" rtl="0" eaLnBrk="1" latinLnBrk="0" hangingPunct="1">
+              <a:lnSpc>
+                <a:spcPct val="90000"/>
+              </a:lnSpc>
+              <a:spcBef>
+                <a:spcPct val="0"/>
+              </a:spcBef>
+              <a:buNone/>
+              <a:defRPr sz="4400" kern="1200">
+                <a:solidFill>
+                  <a:schemeClr val="tx1"/>
+                </a:solidFill>
+                <a:latin typeface="+mj-lt"/>
+                <a:ea typeface="+mj-ea"/>
+                <a:cs typeface="+mj-cs"/>
+              </a:defRPr>
+            </a:lvl1pPr>
+          </a:lstStyle>
+          <a:p>
+            <a:pPr algn="ctr"/>
+            <a:r>
+              <a:rPr lang="zh-CN" altLang="en-US" sz="3200"/>
+              <a:t>通用渲染</a:t>
+            </a:r>
+            <a:endParaRPr lang="zh-CN" altLang="en-US" sz="3200"/>
+          </a:p>
+        </p:txBody>
+      </p:sp>
+      <p:sp>
+        <p:nvSpPr>
+          <p:cNvPr id="23" name="右箭头 22"/>
+          <p:cNvSpPr/>
+          <p:nvPr/>
+        </p:nvSpPr>
+        <p:spPr>
+          <a:xfrm rot="18780000">
+            <a:off x="7439025" y="1979930"/>
+            <a:ext cx="694690" cy="560705"/>
+          </a:xfrm>
+          <a:prstGeom prst="rightArrow">
+            <a:avLst/>
+          </a:prstGeom>
+          <a:solidFill>
+            <a:schemeClr val="accent4">
+              <a:lumMod val="60000"/>
+              <a:lumOff val="40000"/>
+            </a:schemeClr>
+          </a:solidFill>
+          <a:ln>
+            <a:noFill/>
+          </a:ln>
+        </p:spPr>
+        <p:style>
+          <a:lnRef idx="2">
+            <a:schemeClr val="accent1">
+              <a:lumMod val="75000"/>
+            </a:schemeClr>
+          </a:lnRef>
+          <a:fillRef idx="1">
+            <a:schemeClr val="accent1"/>
+          </a:fillRef>
+          <a:effectRef idx="0">
+            <a:srgbClr val="FFFFFF"/>
+          </a:effectRef>
+          <a:fontRef idx="minor">
+            <a:schemeClr val="lt1"/>
+          </a:fontRef>
+        </p:style>
+        <p:txBody>
+          <a:bodyPr rtlCol="0" anchor="ctr"/>
+          <a:p>
+            <a:pPr algn="ctr"/>
+            <a:endParaRPr lang="zh-CN" altLang="en-US"/>
+          </a:p>
+        </p:txBody>
+      </p:sp>
+      <p:sp>
+        <p:nvSpPr>
+          <p:cNvPr id="17" name="椭圆 16"/>
+          <p:cNvSpPr/>
+          <p:nvPr/>
+        </p:nvSpPr>
+        <p:spPr>
+          <a:xfrm>
+            <a:off x="7722870" y="165100"/>
+            <a:ext cx="2093595" cy="2108835"/>
+          </a:xfrm>
+          <a:prstGeom prst="ellipse">
+            <a:avLst/>
+          </a:prstGeom>
+          <a:solidFill>
+            <a:schemeClr val="accent5">
+              <a:lumMod val="40000"/>
+              <a:lumOff val="60000"/>
+            </a:schemeClr>
+          </a:solidFill>
+          <a:ln>
+            <a:noFill/>
+          </a:ln>
+        </p:spPr>
+        <p:style>
+          <a:lnRef idx="2">
+            <a:schemeClr val="accent1">
+              <a:lumMod val="75000"/>
+            </a:schemeClr>
+          </a:lnRef>
+          <a:fillRef idx="1">
+            <a:schemeClr val="accent1"/>
+          </a:fillRef>
+          <a:effectRef idx="0">
+            <a:srgbClr val="FFFFFF"/>
+          </a:effectRef>
+          <a:fontRef idx="minor">
+            <a:schemeClr val="lt1"/>
+          </a:fontRef>
+        </p:style>
+        <p:txBody>
+          <a:bodyPr rtlCol="0" anchor="ctr"/>
+          <a:p>
+            <a:pPr algn="ctr"/>
+            <a:endParaRPr lang="zh-CN" altLang="en-US"/>
+          </a:p>
+        </p:txBody>
+      </p:sp>
+      <p:sp>
+        <p:nvSpPr>
+          <p:cNvPr id="18" name="标题 1"/>
+          <p:cNvSpPr>
+            <a:spLocks noGrp="1"/>
+          </p:cNvSpPr>
+          <p:nvPr/>
+        </p:nvSpPr>
+        <p:spPr>
+          <a:xfrm>
+            <a:off x="7690485" y="927735"/>
+            <a:ext cx="2183765" cy="695960"/>
+          </a:xfrm>
+          <a:prstGeom prst="rect">
+            <a:avLst/>
+          </a:prstGeom>
+        </p:spPr>
+        <p:txBody>
+          <a:bodyPr vert="horz" lIns="91440" tIns="45720" rIns="91440" bIns="45720" rtlCol="0" anchor="ctr">
+            <a:normAutofit/>
+          </a:bodyPr>
+          <a:lstStyle>
+            <a:lvl1pPr algn="l" defTabSz="914400" rtl="0" eaLnBrk="1" latinLnBrk="0" hangingPunct="1">
+              <a:lnSpc>
+                <a:spcPct val="90000"/>
+              </a:lnSpc>
+              <a:spcBef>
+                <a:spcPct val="0"/>
+              </a:spcBef>
+              <a:buNone/>
+              <a:defRPr sz="4400" kern="1200">
+                <a:solidFill>
+                  <a:schemeClr val="tx1"/>
+                </a:solidFill>
+                <a:latin typeface="+mj-lt"/>
+                <a:ea typeface="+mj-ea"/>
+                <a:cs typeface="+mj-cs"/>
+              </a:defRPr>
+            </a:lvl1pPr>
+          </a:lstStyle>
+          <a:p>
+            <a:pPr algn="ctr"/>
+            <a:r>
+              <a:rPr lang="zh-CN" altLang="en-US" sz="3200"/>
+              <a:t>通用计算</a:t>
+            </a:r>
+            <a:endParaRPr lang="zh-CN" altLang="en-US" sz="3200"/>
+          </a:p>
+        </p:txBody>
+      </p:sp>
+      <p:sp>
+        <p:nvSpPr>
+          <p:cNvPr id="19" name="椭圆 18"/>
+          <p:cNvSpPr/>
+          <p:nvPr/>
+        </p:nvSpPr>
+        <p:spPr>
+          <a:xfrm>
+            <a:off x="8352155" y="4458970"/>
+            <a:ext cx="2093595" cy="2108835"/>
+          </a:xfrm>
+          <a:prstGeom prst="ellipse">
+            <a:avLst/>
+          </a:prstGeom>
+          <a:solidFill>
+            <a:schemeClr val="accent5">
+              <a:lumMod val="40000"/>
+              <a:lumOff val="60000"/>
+            </a:schemeClr>
+          </a:solidFill>
+          <a:ln>
+            <a:noFill/>
+          </a:ln>
+        </p:spPr>
+        <p:style>
+          <a:lnRef idx="2">
+            <a:schemeClr val="accent1">
+              <a:lumMod val="75000"/>
+            </a:schemeClr>
+          </a:lnRef>
+          <a:fillRef idx="1">
+            <a:schemeClr val="accent1"/>
+          </a:fillRef>
+          <a:effectRef idx="0">
+            <a:srgbClr val="FFFFFF"/>
+          </a:effectRef>
+          <a:fontRef idx="minor">
+            <a:schemeClr val="lt1"/>
+          </a:fontRef>
+        </p:style>
+        <p:txBody>
+          <a:bodyPr rtlCol="0" anchor="ctr"/>
+          <a:p>
+            <a:pPr algn="ctr"/>
+            <a:endParaRPr lang="zh-CN" altLang="en-US"/>
+          </a:p>
+        </p:txBody>
+      </p:sp>
+      <p:sp>
+        <p:nvSpPr>
+          <p:cNvPr id="22" name="标题 1"/>
+          <p:cNvSpPr>
+            <a:spLocks noGrp="1"/>
+          </p:cNvSpPr>
+          <p:nvPr/>
+        </p:nvSpPr>
+        <p:spPr>
+          <a:xfrm>
+            <a:off x="8303260" y="5221605"/>
+            <a:ext cx="2183765" cy="695960"/>
+          </a:xfrm>
+          <a:prstGeom prst="rect">
+            <a:avLst/>
+          </a:prstGeom>
+        </p:spPr>
+        <p:txBody>
+          <a:bodyPr vert="horz" lIns="91440" tIns="45720" rIns="91440" bIns="45720" rtlCol="0" anchor="ctr">
+            <a:normAutofit/>
+          </a:bodyPr>
+          <a:lstStyle>
+            <a:lvl1pPr algn="l" defTabSz="914400" rtl="0" eaLnBrk="1" latinLnBrk="0" hangingPunct="1">
+              <a:lnSpc>
+                <a:spcPct val="90000"/>
+              </a:lnSpc>
+              <a:spcBef>
+                <a:spcPct val="0"/>
+              </a:spcBef>
+              <a:buNone/>
+              <a:defRPr sz="4400" kern="1200">
+                <a:solidFill>
+                  <a:schemeClr val="tx1"/>
+                </a:solidFill>
+                <a:latin typeface="+mj-lt"/>
+                <a:ea typeface="+mj-ea"/>
+                <a:cs typeface="+mj-cs"/>
+              </a:defRPr>
+            </a:lvl1pPr>
+          </a:lstStyle>
+          <a:p>
+            <a:pPr algn="ctr"/>
+            <a:r>
+              <a:rPr lang="zh-CN" altLang="en-US" sz="3200"/>
+              <a:t>光追渲染</a:t>
+            </a:r>
+            <a:endParaRPr lang="zh-CN" altLang="en-US" sz="3200"/>
+          </a:p>
+        </p:txBody>
+      </p:sp>
+      <p:sp>
+        <p:nvSpPr>
+          <p:cNvPr id="24" name="右箭头 23"/>
+          <p:cNvSpPr/>
+          <p:nvPr/>
+        </p:nvSpPr>
+        <p:spPr>
+          <a:xfrm rot="10560000">
+            <a:off x="3614420" y="3519170"/>
+            <a:ext cx="694690" cy="560705"/>
+          </a:xfrm>
+          <a:prstGeom prst="rightArrow">
+            <a:avLst/>
+          </a:prstGeom>
+          <a:solidFill>
+            <a:schemeClr val="accent4">
+              <a:lumMod val="60000"/>
+              <a:lumOff val="40000"/>
+            </a:schemeClr>
+          </a:solidFill>
+          <a:ln>
+            <a:noFill/>
+          </a:ln>
+        </p:spPr>
+        <p:style>
+          <a:lnRef idx="2">
+            <a:schemeClr val="accent1">
+              <a:lumMod val="75000"/>
+            </a:schemeClr>
+          </a:lnRef>
+          <a:fillRef idx="1">
+            <a:schemeClr val="accent1"/>
+          </a:fillRef>
+          <a:effectRef idx="0">
+            <a:srgbClr val="FFFFFF"/>
+          </a:effectRef>
+          <a:fontRef idx="minor">
+            <a:schemeClr val="lt1"/>
+          </a:fontRef>
+        </p:style>
+        <p:txBody>
+          <a:bodyPr rtlCol="0" anchor="ctr"/>
+          <a:p>
+            <a:pPr algn="ctr"/>
+            <a:endParaRPr lang="zh-CN" altLang="en-US"/>
+          </a:p>
+        </p:txBody>
+      </p:sp>
+      <p:sp>
+        <p:nvSpPr>
+          <p:cNvPr id="25" name="右箭头 24"/>
+          <p:cNvSpPr/>
+          <p:nvPr/>
+        </p:nvSpPr>
+        <p:spPr>
+          <a:xfrm rot="1860000">
+            <a:off x="7716520" y="4542790"/>
+            <a:ext cx="751840" cy="560705"/>
+          </a:xfrm>
+          <a:prstGeom prst="rightArrow">
+            <a:avLst/>
+          </a:prstGeom>
+          <a:solidFill>
+            <a:schemeClr val="accent4">
+              <a:lumMod val="60000"/>
+              <a:lumOff val="40000"/>
+            </a:schemeClr>
+          </a:solidFill>
+          <a:ln>
+            <a:noFill/>
+          </a:ln>
+        </p:spPr>
+        <p:style>
+          <a:lnRef idx="2">
+            <a:schemeClr val="accent1">
+              <a:lumMod val="75000"/>
+            </a:schemeClr>
+          </a:lnRef>
+          <a:fillRef idx="1">
+            <a:schemeClr val="accent1"/>
+          </a:fillRef>
+          <a:effectRef idx="0">
+            <a:srgbClr val="FFFFFF"/>
+          </a:effectRef>
+          <a:fontRef idx="minor">
+            <a:schemeClr val="lt1"/>
+          </a:fontRef>
+        </p:style>
+        <p:txBody>
+          <a:bodyPr rtlCol="0" anchor="ctr"/>
+          <a:p>
+            <a:pPr algn="ctr"/>
+            <a:endParaRPr lang="zh-CN" altLang="en-US"/>
+          </a:p>
+        </p:txBody>
+      </p:sp>
+      <p:sp>
+        <p:nvSpPr>
+          <p:cNvPr id="26" name="标题 1"/>
+          <p:cNvSpPr>
+            <a:spLocks noGrp="1"/>
+          </p:cNvSpPr>
+          <p:nvPr/>
+        </p:nvSpPr>
+        <p:spPr>
+          <a:xfrm>
+            <a:off x="5600700" y="1964690"/>
+            <a:ext cx="1167130" cy="468630"/>
+          </a:xfrm>
+          <a:prstGeom prst="rect">
+            <a:avLst/>
+          </a:prstGeom>
+        </p:spPr>
+        <p:txBody>
+          <a:bodyPr vert="horz" lIns="91440" tIns="45720" rIns="91440" bIns="45720" rtlCol="0" anchor="ctr">
+            <a:normAutofit fontScale="70000"/>
+          </a:bodyPr>
+          <a:lstStyle>
+            <a:lvl1pPr algn="l" defTabSz="914400" rtl="0" eaLnBrk="1" latinLnBrk="0" hangingPunct="1">
+              <a:lnSpc>
+                <a:spcPct val="90000"/>
+              </a:lnSpc>
+              <a:spcBef>
+                <a:spcPct val="0"/>
+              </a:spcBef>
+              <a:buNone/>
+              <a:defRPr sz="4400" kern="1200">
+                <a:solidFill>
+                  <a:schemeClr val="tx1"/>
+                </a:solidFill>
+                <a:latin typeface="+mj-lt"/>
+                <a:ea typeface="+mj-ea"/>
+                <a:cs typeface="+mj-cs"/>
+              </a:defRPr>
+            </a:lvl1pPr>
+          </a:lstStyle>
+          <a:p>
+            <a:pPr algn="ctr"/>
+            <a:r>
+              <a:rPr lang="en-US" altLang="zh-CN" sz="3200">
+                <a:solidFill>
+                  <a:schemeClr val="accent4">
+                    <a:lumMod val="50000"/>
+                  </a:schemeClr>
+                </a:solidFill>
+              </a:rPr>
+              <a:t>core</a:t>
+            </a:r>
+            <a:endParaRPr lang="en-US" altLang="zh-CN" sz="3200">
+              <a:solidFill>
+                <a:schemeClr val="accent4">
+                  <a:lumMod val="50000"/>
+                </a:schemeClr>
+              </a:solidFill>
+            </a:endParaRPr>
+          </a:p>
+        </p:txBody>
+      </p:sp>
+      <p:sp>
+        <p:nvSpPr>
+          <p:cNvPr id="30" name="椭圆 29"/>
+          <p:cNvSpPr/>
+          <p:nvPr/>
+        </p:nvSpPr>
+        <p:spPr>
+          <a:xfrm>
+            <a:off x="4813300" y="2354580"/>
+            <a:ext cx="2743200" cy="2743200"/>
+          </a:xfrm>
+          <a:prstGeom prst="ellipse">
+            <a:avLst/>
+          </a:prstGeom>
+          <a:noFill/>
+          <a:ln>
+            <a:solidFill>
+              <a:schemeClr val="accent4">
+                <a:lumMod val="50000"/>
+              </a:schemeClr>
+            </a:solidFill>
+          </a:ln>
+        </p:spPr>
+        <p:style>
+          <a:lnRef idx="2">
+            <a:schemeClr val="accent1">
+              <a:lumMod val="75000"/>
+            </a:schemeClr>
+          </a:lnRef>
+          <a:fillRef idx="1">
+            <a:schemeClr val="accent1"/>
+          </a:fillRef>
+          <a:effectRef idx="0">
+            <a:srgbClr val="FFFFFF"/>
+          </a:effectRef>
+          <a:fontRef idx="minor">
+            <a:schemeClr val="lt1"/>
+          </a:fontRef>
+        </p:style>
+        <p:txBody>
+          <a:bodyPr rtlCol="0" anchor="ctr"/>
+          <a:p>
+            <a:pPr algn="ctr"/>
+            <a:endParaRPr lang="zh-CN" altLang="en-US"/>
+          </a:p>
+        </p:txBody>
+      </p:sp>
+    </p:spTree>
+  </p:cSld>
+  <p:clrMapOvr>
+    <a:masterClrMapping/>
+  </p:clrMapOvr>
+</p:sld>
+</file>
+
 <file path=ppt/tags/tag1.xml><?xml version="1.0" encoding="utf-8"?>
+<p:tagLst xmlns:p="http://schemas.openxmlformats.org/presentationml/2006/main">
+  <p:tag name="KSO_WM_BEAUTIFY_FLAG" val=""/>
+</p:tagLst>
+</file>
+
+<file path=ppt/tags/tag2.xml><?xml version="1.0" encoding="utf-8"?>
 <p:tagLst xmlns:p="http://schemas.openxmlformats.org/presentationml/2006/main">
   <p:tag name="COMMONDATA" val="eyJoZGlkIjoiMDQ3NWUyMzY0ZmQ3NmNkNDlmNWNjYjBiMzg2ZWI4MDkifQ=="/>
 </p:tagLst>

</xml_diff>

<commit_message>
fix: improve the separate rendering pass function.
</commit_message>
<xml_diff>
--- a/src/voxgpu/gpu/helper.pptx
+++ b/src/voxgpu/gpu/helper.pptx
@@ -6822,7 +6822,7 @@
         <p:spPr>
           <a:xfrm>
             <a:off x="155575" y="163195"/>
-            <a:ext cx="8196580" cy="711200"/>
+            <a:ext cx="5050155" cy="497205"/>
           </a:xfrm>
         </p:spPr>
         <p:txBody>
@@ -6831,10 +6831,10 @@
           </a:bodyPr>
           <a:p>
             <a:r>
-              <a:rPr lang="en-US" sz="3200"/>
+              <a:rPr lang="en-US" sz="2000"/>
               <a:t>MRCS(Mixed Rendering/Computing System)</a:t>
             </a:r>
-            <a:endParaRPr lang="en-US" sz="3200"/>
+            <a:endParaRPr lang="en-US" sz="2000"/>
           </a:p>
         </p:txBody>
       </p:sp>
@@ -6846,8 +6846,8 @@
         </p:nvSpPr>
         <p:spPr>
           <a:xfrm>
-            <a:off x="3070225" y="660400"/>
-            <a:ext cx="6229350" cy="6131560"/>
+            <a:off x="3110865" y="723900"/>
+            <a:ext cx="6089650" cy="5993765"/>
           </a:xfrm>
           <a:prstGeom prst="ellipse">
             <a:avLst/>
@@ -7544,6 +7544,535 @@
           <a:p>
             <a:pPr algn="ctr"/>
             <a:endParaRPr lang="zh-CN" altLang="en-US"/>
+          </a:p>
+        </p:txBody>
+      </p:sp>
+      <p:sp>
+        <p:nvSpPr>
+          <p:cNvPr id="3" name="椭圆 2"/>
+          <p:cNvSpPr/>
+          <p:nvPr/>
+        </p:nvSpPr>
+        <p:spPr>
+          <a:xfrm>
+            <a:off x="2686685" y="1104265"/>
+            <a:ext cx="1330960" cy="1340485"/>
+          </a:xfrm>
+          <a:prstGeom prst="ellipse">
+            <a:avLst/>
+          </a:prstGeom>
+          <a:solidFill>
+            <a:schemeClr val="accent4">
+              <a:lumMod val="60000"/>
+              <a:lumOff val="40000"/>
+            </a:schemeClr>
+          </a:solidFill>
+          <a:ln>
+            <a:noFill/>
+          </a:ln>
+        </p:spPr>
+        <p:style>
+          <a:lnRef idx="2">
+            <a:schemeClr val="accent1">
+              <a:lumMod val="75000"/>
+            </a:schemeClr>
+          </a:lnRef>
+          <a:fillRef idx="1">
+            <a:schemeClr val="accent1"/>
+          </a:fillRef>
+          <a:effectRef idx="0">
+            <a:srgbClr val="FFFFFF"/>
+          </a:effectRef>
+          <a:fontRef idx="minor">
+            <a:schemeClr val="lt1"/>
+          </a:fontRef>
+        </p:style>
+        <p:txBody>
+          <a:bodyPr rtlCol="0" anchor="ctr"/>
+          <a:p>
+            <a:pPr algn="ctr"/>
+            <a:endParaRPr lang="zh-CN" altLang="en-US"/>
+          </a:p>
+        </p:txBody>
+      </p:sp>
+      <p:sp>
+        <p:nvSpPr>
+          <p:cNvPr id="4" name="标题 1"/>
+          <p:cNvSpPr>
+            <a:spLocks noGrp="1"/>
+          </p:cNvSpPr>
+          <p:nvPr/>
+        </p:nvSpPr>
+        <p:spPr>
+          <a:xfrm>
+            <a:off x="2713038" y="1582103"/>
+            <a:ext cx="1278255" cy="384810"/>
+          </a:xfrm>
+          <a:prstGeom prst="rect">
+            <a:avLst/>
+          </a:prstGeom>
+        </p:spPr>
+        <p:txBody>
+          <a:bodyPr vert="horz" lIns="91440" tIns="45720" rIns="91440" bIns="45720" rtlCol="0" anchor="ctr">
+            <a:normAutofit fontScale="90000"/>
+          </a:bodyPr>
+          <a:lstStyle>
+            <a:lvl1pPr algn="l" defTabSz="914400" rtl="0" eaLnBrk="1" latinLnBrk="0" hangingPunct="1">
+              <a:lnSpc>
+                <a:spcPct val="90000"/>
+              </a:lnSpc>
+              <a:spcBef>
+                <a:spcPct val="0"/>
+              </a:spcBef>
+              <a:buNone/>
+              <a:defRPr sz="4400" kern="1200">
+                <a:solidFill>
+                  <a:schemeClr val="tx1"/>
+                </a:solidFill>
+                <a:latin typeface="+mj-lt"/>
+                <a:ea typeface="+mj-ea"/>
+                <a:cs typeface="+mj-cs"/>
+              </a:defRPr>
+            </a:lvl1pPr>
+          </a:lstStyle>
+          <a:p>
+            <a:pPr algn="ctr"/>
+            <a:r>
+              <a:rPr lang="zh-CN" altLang="en-US" sz="2000"/>
+              <a:t>展示系统</a:t>
+            </a:r>
+            <a:endParaRPr lang="zh-CN" altLang="en-US" sz="2000"/>
+          </a:p>
+        </p:txBody>
+      </p:sp>
+      <p:sp>
+        <p:nvSpPr>
+          <p:cNvPr id="5" name="椭圆 4"/>
+          <p:cNvSpPr/>
+          <p:nvPr/>
+        </p:nvSpPr>
+        <p:spPr>
+          <a:xfrm>
+            <a:off x="2804160" y="5276215"/>
+            <a:ext cx="1330960" cy="1340485"/>
+          </a:xfrm>
+          <a:prstGeom prst="ellipse">
+            <a:avLst/>
+          </a:prstGeom>
+          <a:solidFill>
+            <a:schemeClr val="accent4">
+              <a:lumMod val="60000"/>
+              <a:lumOff val="40000"/>
+            </a:schemeClr>
+          </a:solidFill>
+          <a:ln>
+            <a:noFill/>
+          </a:ln>
+        </p:spPr>
+        <p:style>
+          <a:lnRef idx="2">
+            <a:schemeClr val="accent1">
+              <a:lumMod val="75000"/>
+            </a:schemeClr>
+          </a:lnRef>
+          <a:fillRef idx="1">
+            <a:schemeClr val="accent1"/>
+          </a:fillRef>
+          <a:effectRef idx="0">
+            <a:srgbClr val="FFFFFF"/>
+          </a:effectRef>
+          <a:fontRef idx="minor">
+            <a:schemeClr val="lt1"/>
+          </a:fontRef>
+        </p:style>
+        <p:txBody>
+          <a:bodyPr rtlCol="0" anchor="ctr"/>
+          <a:p>
+            <a:pPr algn="ctr"/>
+            <a:endParaRPr lang="zh-CN" altLang="en-US"/>
+          </a:p>
+        </p:txBody>
+      </p:sp>
+      <p:sp>
+        <p:nvSpPr>
+          <p:cNvPr id="6" name="标题 1"/>
+          <p:cNvSpPr>
+            <a:spLocks noGrp="1"/>
+          </p:cNvSpPr>
+          <p:nvPr/>
+        </p:nvSpPr>
+        <p:spPr>
+          <a:xfrm>
+            <a:off x="2830513" y="5754053"/>
+            <a:ext cx="1278255" cy="384810"/>
+          </a:xfrm>
+          <a:prstGeom prst="rect">
+            <a:avLst/>
+          </a:prstGeom>
+        </p:spPr>
+        <p:txBody>
+          <a:bodyPr vert="horz" lIns="91440" tIns="45720" rIns="91440" bIns="45720" rtlCol="0" anchor="ctr">
+            <a:normAutofit fontScale="90000"/>
+          </a:bodyPr>
+          <a:lstStyle>
+            <a:lvl1pPr algn="l" defTabSz="914400" rtl="0" eaLnBrk="1" latinLnBrk="0" hangingPunct="1">
+              <a:lnSpc>
+                <a:spcPct val="90000"/>
+              </a:lnSpc>
+              <a:spcBef>
+                <a:spcPct val="0"/>
+              </a:spcBef>
+              <a:buNone/>
+              <a:defRPr sz="4400" kern="1200">
+                <a:solidFill>
+                  <a:schemeClr val="tx1"/>
+                </a:solidFill>
+                <a:latin typeface="+mj-lt"/>
+                <a:ea typeface="+mj-ea"/>
+                <a:cs typeface="+mj-cs"/>
+              </a:defRPr>
+            </a:lvl1pPr>
+          </a:lstStyle>
+          <a:p>
+            <a:pPr algn="ctr"/>
+            <a:r>
+              <a:rPr lang="zh-CN" altLang="en-US" sz="2000"/>
+              <a:t>材质编辑</a:t>
+            </a:r>
+            <a:endParaRPr lang="zh-CN" altLang="en-US" sz="2000"/>
+          </a:p>
+        </p:txBody>
+      </p:sp>
+      <p:sp>
+        <p:nvSpPr>
+          <p:cNvPr id="7" name="椭圆 6"/>
+          <p:cNvSpPr/>
+          <p:nvPr/>
+        </p:nvSpPr>
+        <p:spPr>
+          <a:xfrm>
+            <a:off x="8642985" y="2537460"/>
+            <a:ext cx="1330960" cy="1340485"/>
+          </a:xfrm>
+          <a:prstGeom prst="ellipse">
+            <a:avLst/>
+          </a:prstGeom>
+          <a:solidFill>
+            <a:schemeClr val="accent4">
+              <a:lumMod val="60000"/>
+              <a:lumOff val="40000"/>
+            </a:schemeClr>
+          </a:solidFill>
+          <a:ln>
+            <a:noFill/>
+          </a:ln>
+        </p:spPr>
+        <p:style>
+          <a:lnRef idx="2">
+            <a:schemeClr val="accent1">
+              <a:lumMod val="75000"/>
+            </a:schemeClr>
+          </a:lnRef>
+          <a:fillRef idx="1">
+            <a:schemeClr val="accent1"/>
+          </a:fillRef>
+          <a:effectRef idx="0">
+            <a:srgbClr val="FFFFFF"/>
+          </a:effectRef>
+          <a:fontRef idx="minor">
+            <a:schemeClr val="lt1"/>
+          </a:fontRef>
+        </p:style>
+        <p:txBody>
+          <a:bodyPr rtlCol="0" anchor="ctr"/>
+          <a:p>
+            <a:pPr algn="ctr"/>
+            <a:endParaRPr lang="zh-CN" altLang="en-US"/>
+          </a:p>
+        </p:txBody>
+      </p:sp>
+      <p:sp>
+        <p:nvSpPr>
+          <p:cNvPr id="8" name="标题 1"/>
+          <p:cNvSpPr>
+            <a:spLocks noGrp="1"/>
+          </p:cNvSpPr>
+          <p:nvPr/>
+        </p:nvSpPr>
+        <p:spPr>
+          <a:xfrm>
+            <a:off x="8669338" y="3015298"/>
+            <a:ext cx="1278255" cy="384810"/>
+          </a:xfrm>
+          <a:prstGeom prst="rect">
+            <a:avLst/>
+          </a:prstGeom>
+        </p:spPr>
+        <p:txBody>
+          <a:bodyPr vert="horz" lIns="91440" tIns="45720" rIns="91440" bIns="45720" rtlCol="0" anchor="ctr">
+            <a:normAutofit fontScale="90000"/>
+          </a:bodyPr>
+          <a:lstStyle>
+            <a:lvl1pPr algn="l" defTabSz="914400" rtl="0" eaLnBrk="1" latinLnBrk="0" hangingPunct="1">
+              <a:lnSpc>
+                <a:spcPct val="90000"/>
+              </a:lnSpc>
+              <a:spcBef>
+                <a:spcPct val="0"/>
+              </a:spcBef>
+              <a:buNone/>
+              <a:defRPr sz="4400" kern="1200">
+                <a:solidFill>
+                  <a:schemeClr val="tx1"/>
+                </a:solidFill>
+                <a:latin typeface="+mj-lt"/>
+                <a:ea typeface="+mj-ea"/>
+                <a:cs typeface="+mj-cs"/>
+              </a:defRPr>
+            </a:lvl1pPr>
+          </a:lstStyle>
+          <a:p>
+            <a:pPr algn="ctr"/>
+            <a:r>
+              <a:rPr lang="zh-CN" altLang="en-US" sz="2000"/>
+              <a:t>几何设计</a:t>
+            </a:r>
+            <a:endParaRPr lang="zh-CN" altLang="en-US" sz="2000"/>
+          </a:p>
+        </p:txBody>
+      </p:sp>
+      <p:cxnSp>
+        <p:nvCxnSpPr>
+          <p:cNvPr id="15" name="直接箭头连接符 14"/>
+          <p:cNvCxnSpPr/>
+          <p:nvPr/>
+        </p:nvCxnSpPr>
+        <p:spPr>
+          <a:xfrm flipH="1" flipV="1">
+            <a:off x="3882390" y="2188210"/>
+            <a:ext cx="718185" cy="561340"/>
+          </a:xfrm>
+          <a:prstGeom prst="straightConnector1">
+            <a:avLst/>
+          </a:prstGeom>
+          <a:ln>
+            <a:solidFill>
+              <a:schemeClr val="accent4">
+                <a:lumMod val="60000"/>
+                <a:lumOff val="40000"/>
+              </a:schemeClr>
+            </a:solidFill>
+            <a:tailEnd type="arrow"/>
+          </a:ln>
+        </p:spPr>
+        <p:style>
+          <a:lnRef idx="2">
+            <a:schemeClr val="accent1"/>
+          </a:lnRef>
+          <a:fillRef idx="0">
+            <a:srgbClr val="FFFFFF"/>
+          </a:fillRef>
+          <a:effectRef idx="0">
+            <a:srgbClr val="FFFFFF"/>
+          </a:effectRef>
+          <a:fontRef idx="minor">
+            <a:schemeClr val="tx1"/>
+          </a:fontRef>
+        </p:style>
+      </p:cxnSp>
+      <p:sp>
+        <p:nvSpPr>
+          <p:cNvPr id="20" name="椭圆 19"/>
+          <p:cNvSpPr/>
+          <p:nvPr/>
+        </p:nvSpPr>
+        <p:spPr>
+          <a:xfrm>
+            <a:off x="6972300" y="5451475"/>
+            <a:ext cx="1330960" cy="1340485"/>
+          </a:xfrm>
+          <a:prstGeom prst="ellipse">
+            <a:avLst/>
+          </a:prstGeom>
+          <a:solidFill>
+            <a:schemeClr val="accent4">
+              <a:lumMod val="60000"/>
+              <a:lumOff val="40000"/>
+            </a:schemeClr>
+          </a:solidFill>
+          <a:ln>
+            <a:noFill/>
+          </a:ln>
+        </p:spPr>
+        <p:style>
+          <a:lnRef idx="2">
+            <a:schemeClr val="accent1">
+              <a:lumMod val="75000"/>
+            </a:schemeClr>
+          </a:lnRef>
+          <a:fillRef idx="1">
+            <a:schemeClr val="accent1"/>
+          </a:fillRef>
+          <a:effectRef idx="0">
+            <a:srgbClr val="FFFFFF"/>
+          </a:effectRef>
+          <a:fontRef idx="minor">
+            <a:schemeClr val="lt1"/>
+          </a:fontRef>
+        </p:style>
+        <p:txBody>
+          <a:bodyPr rtlCol="0" anchor="ctr"/>
+          <a:p>
+            <a:pPr algn="ctr"/>
+            <a:endParaRPr lang="zh-CN" altLang="en-US"/>
+          </a:p>
+        </p:txBody>
+      </p:sp>
+      <p:sp>
+        <p:nvSpPr>
+          <p:cNvPr id="21" name="标题 1"/>
+          <p:cNvSpPr>
+            <a:spLocks noGrp="1"/>
+          </p:cNvSpPr>
+          <p:nvPr/>
+        </p:nvSpPr>
+        <p:spPr>
+          <a:xfrm>
+            <a:off x="6998653" y="5929313"/>
+            <a:ext cx="1278255" cy="384810"/>
+          </a:xfrm>
+          <a:prstGeom prst="rect">
+            <a:avLst/>
+          </a:prstGeom>
+        </p:spPr>
+        <p:txBody>
+          <a:bodyPr vert="horz" lIns="91440" tIns="45720" rIns="91440" bIns="45720" rtlCol="0" anchor="ctr">
+            <a:normAutofit fontScale="90000"/>
+          </a:bodyPr>
+          <a:lstStyle>
+            <a:lvl1pPr algn="l" defTabSz="914400" rtl="0" eaLnBrk="1" latinLnBrk="0" hangingPunct="1">
+              <a:lnSpc>
+                <a:spcPct val="90000"/>
+              </a:lnSpc>
+              <a:spcBef>
+                <a:spcPct val="0"/>
+              </a:spcBef>
+              <a:buNone/>
+              <a:defRPr sz="4400" kern="1200">
+                <a:solidFill>
+                  <a:schemeClr val="tx1"/>
+                </a:solidFill>
+                <a:latin typeface="+mj-lt"/>
+                <a:ea typeface="+mj-ea"/>
+                <a:cs typeface="+mj-cs"/>
+              </a:defRPr>
+            </a:lvl1pPr>
+          </a:lstStyle>
+          <a:p>
+            <a:pPr algn="ctr"/>
+            <a:r>
+              <a:rPr lang="zh-CN" altLang="en-US" sz="2000"/>
+              <a:t>游戏系统</a:t>
+            </a:r>
+            <a:endParaRPr lang="zh-CN" altLang="en-US" sz="2000"/>
+          </a:p>
+        </p:txBody>
+      </p:sp>
+      <p:sp>
+        <p:nvSpPr>
+          <p:cNvPr id="27" name="椭圆 26"/>
+          <p:cNvSpPr/>
+          <p:nvPr/>
+        </p:nvSpPr>
+        <p:spPr>
+          <a:xfrm>
+            <a:off x="5939155" y="66040"/>
+            <a:ext cx="1330960" cy="1340485"/>
+          </a:xfrm>
+          <a:prstGeom prst="ellipse">
+            <a:avLst/>
+          </a:prstGeom>
+          <a:solidFill>
+            <a:schemeClr val="accent4">
+              <a:lumMod val="60000"/>
+              <a:lumOff val="40000"/>
+            </a:schemeClr>
+          </a:solidFill>
+          <a:ln>
+            <a:noFill/>
+          </a:ln>
+        </p:spPr>
+        <p:style>
+          <a:lnRef idx="2">
+            <a:schemeClr val="accent1">
+              <a:lumMod val="75000"/>
+            </a:schemeClr>
+          </a:lnRef>
+          <a:fillRef idx="1">
+            <a:schemeClr val="accent1"/>
+          </a:fillRef>
+          <a:effectRef idx="0">
+            <a:srgbClr val="FFFFFF"/>
+          </a:effectRef>
+          <a:fontRef idx="minor">
+            <a:schemeClr val="lt1"/>
+          </a:fontRef>
+        </p:style>
+        <p:txBody>
+          <a:bodyPr rtlCol="0" anchor="ctr"/>
+          <a:p>
+            <a:pPr algn="ctr"/>
+            <a:endParaRPr lang="zh-CN" altLang="en-US"/>
+          </a:p>
+        </p:txBody>
+      </p:sp>
+      <p:sp>
+        <p:nvSpPr>
+          <p:cNvPr id="28" name="标题 1"/>
+          <p:cNvSpPr>
+            <a:spLocks noGrp="1"/>
+          </p:cNvSpPr>
+          <p:nvPr/>
+        </p:nvSpPr>
+        <p:spPr>
+          <a:xfrm>
+            <a:off x="5965508" y="543878"/>
+            <a:ext cx="1278255" cy="384810"/>
+          </a:xfrm>
+          <a:prstGeom prst="rect">
+            <a:avLst/>
+          </a:prstGeom>
+        </p:spPr>
+        <p:txBody>
+          <a:bodyPr vert="horz" lIns="91440" tIns="45720" rIns="91440" bIns="45720" rtlCol="0" anchor="ctr">
+            <a:normAutofit fontScale="90000"/>
+          </a:bodyPr>
+          <a:lstStyle>
+            <a:lvl1pPr algn="l" defTabSz="914400" rtl="0" eaLnBrk="1" latinLnBrk="0" hangingPunct="1">
+              <a:lnSpc>
+                <a:spcPct val="90000"/>
+              </a:lnSpc>
+              <a:spcBef>
+                <a:spcPct val="0"/>
+              </a:spcBef>
+              <a:buNone/>
+              <a:defRPr sz="4400" kern="1200">
+                <a:solidFill>
+                  <a:schemeClr val="tx1"/>
+                </a:solidFill>
+                <a:latin typeface="+mj-lt"/>
+                <a:ea typeface="+mj-ea"/>
+                <a:cs typeface="+mj-cs"/>
+              </a:defRPr>
+            </a:lvl1pPr>
+          </a:lstStyle>
+          <a:p>
+            <a:pPr algn="ctr"/>
+            <a:r>
+              <a:rPr lang="zh-CN" altLang="en-US" sz="2000"/>
+              <a:t>仿真模拟</a:t>
+            </a:r>
+            <a:endParaRPr lang="zh-CN" altLang="en-US" sz="2000"/>
           </a:p>
         </p:txBody>
       </p:sp>

</xml_diff>